<commit_message>
revised based on Meng's comments
</commit_message>
<xml_diff>
--- a/slides/report/newStar/images/future.pptx
+++ b/slides/report/newStar/images/future.pptx
@@ -263,7 +263,7 @@
           <a:p>
             <a:fld id="{BFAC98C9-F81E-40FF-B63F-B5C38B74D680}" type="datetimeFigureOut">
               <a:rPr lang="en-US" smtClean="0"/>
-              <a:t>2022-04-21, Thu</a:t>
+              <a:t>2022-04-22, Fri</a:t>
             </a:fld>
             <a:endParaRPr lang="en-US"/>
           </a:p>
@@ -463,7 +463,7 @@
           <a:p>
             <a:fld id="{BFAC98C9-F81E-40FF-B63F-B5C38B74D680}" type="datetimeFigureOut">
               <a:rPr lang="en-US" smtClean="0"/>
-              <a:t>2022-04-21, Thu</a:t>
+              <a:t>2022-04-22, Fri</a:t>
             </a:fld>
             <a:endParaRPr lang="en-US"/>
           </a:p>
@@ -673,7 +673,7 @@
           <a:p>
             <a:fld id="{BFAC98C9-F81E-40FF-B63F-B5C38B74D680}" type="datetimeFigureOut">
               <a:rPr lang="en-US" smtClean="0"/>
-              <a:t>2022-04-21, Thu</a:t>
+              <a:t>2022-04-22, Fri</a:t>
             </a:fld>
             <a:endParaRPr lang="en-US"/>
           </a:p>
@@ -873,7 +873,7 @@
           <a:p>
             <a:fld id="{BFAC98C9-F81E-40FF-B63F-B5C38B74D680}" type="datetimeFigureOut">
               <a:rPr lang="en-US" smtClean="0"/>
-              <a:t>2022-04-21, Thu</a:t>
+              <a:t>2022-04-22, Fri</a:t>
             </a:fld>
             <a:endParaRPr lang="en-US"/>
           </a:p>
@@ -1149,7 +1149,7 @@
           <a:p>
             <a:fld id="{BFAC98C9-F81E-40FF-B63F-B5C38B74D680}" type="datetimeFigureOut">
               <a:rPr lang="en-US" smtClean="0"/>
-              <a:t>2022-04-21, Thu</a:t>
+              <a:t>2022-04-22, Fri</a:t>
             </a:fld>
             <a:endParaRPr lang="en-US"/>
           </a:p>
@@ -1417,7 +1417,7 @@
           <a:p>
             <a:fld id="{BFAC98C9-F81E-40FF-B63F-B5C38B74D680}" type="datetimeFigureOut">
               <a:rPr lang="en-US" smtClean="0"/>
-              <a:t>2022-04-21, Thu</a:t>
+              <a:t>2022-04-22, Fri</a:t>
             </a:fld>
             <a:endParaRPr lang="en-US"/>
           </a:p>
@@ -1832,7 +1832,7 @@
           <a:p>
             <a:fld id="{BFAC98C9-F81E-40FF-B63F-B5C38B74D680}" type="datetimeFigureOut">
               <a:rPr lang="en-US" smtClean="0"/>
-              <a:t>2022-04-21, Thu</a:t>
+              <a:t>2022-04-22, Fri</a:t>
             </a:fld>
             <a:endParaRPr lang="en-US"/>
           </a:p>
@@ -1974,7 +1974,7 @@
           <a:p>
             <a:fld id="{BFAC98C9-F81E-40FF-B63F-B5C38B74D680}" type="datetimeFigureOut">
               <a:rPr lang="en-US" smtClean="0"/>
-              <a:t>2022-04-21, Thu</a:t>
+              <a:t>2022-04-22, Fri</a:t>
             </a:fld>
             <a:endParaRPr lang="en-US"/>
           </a:p>
@@ -2087,7 +2087,7 @@
           <a:p>
             <a:fld id="{BFAC98C9-F81E-40FF-B63F-B5C38B74D680}" type="datetimeFigureOut">
               <a:rPr lang="en-US" smtClean="0"/>
-              <a:t>2022-04-21, Thu</a:t>
+              <a:t>2022-04-22, Fri</a:t>
             </a:fld>
             <a:endParaRPr lang="en-US"/>
           </a:p>
@@ -2400,7 +2400,7 @@
           <a:p>
             <a:fld id="{BFAC98C9-F81E-40FF-B63F-B5C38B74D680}" type="datetimeFigureOut">
               <a:rPr lang="en-US" smtClean="0"/>
-              <a:t>2022-04-21, Thu</a:t>
+              <a:t>2022-04-22, Fri</a:t>
             </a:fld>
             <a:endParaRPr lang="en-US"/>
           </a:p>
@@ -2689,7 +2689,7 @@
           <a:p>
             <a:fld id="{BFAC98C9-F81E-40FF-B63F-B5C38B74D680}" type="datetimeFigureOut">
               <a:rPr lang="en-US" smtClean="0"/>
-              <a:t>2022-04-21, Thu</a:t>
+              <a:t>2022-04-22, Fri</a:t>
             </a:fld>
             <a:endParaRPr lang="en-US"/>
           </a:p>
@@ -2932,7 +2932,7 @@
           <a:p>
             <a:fld id="{BFAC98C9-F81E-40FF-B63F-B5C38B74D680}" type="datetimeFigureOut">
               <a:rPr lang="en-US" smtClean="0"/>
-              <a:t>2022-04-21, Thu</a:t>
+              <a:t>2022-04-22, Fri</a:t>
             </a:fld>
             <a:endParaRPr lang="en-US"/>
           </a:p>
@@ -3834,15 +3834,15 @@
           <a:p>
             <a:r>
               <a:rPr lang="zh-CN" altLang="en-US" sz="1400" b="1" dirty="0"/>
-              <a:t>发展新技术方法，引领</a:t>
+              <a:t>发展新技术方法，引领科学性</a:t>
             </a:r>
             <a:r>
               <a:rPr lang="en-US" altLang="zh-CN" sz="1400" b="1" dirty="0"/>
-              <a:t>DA-RT</a:t>
-            </a:r>
-            <a:r>
-              <a:rPr lang="zh-CN" altLang="en-US" sz="1400" b="1" dirty="0"/>
-              <a:t>趋势</a:t>
+              <a:t>/</a:t>
+            </a:r>
+            <a:r>
+              <a:rPr lang="zh-CN" altLang="en-US" sz="1400" b="1"/>
+              <a:t>规范性研究</a:t>
             </a:r>
             <a:endParaRPr lang="en-US" altLang="zh-CN" sz="1400" b="1" dirty="0"/>
           </a:p>

</xml_diff>

<commit_message>
correct the last plot
</commit_message>
<xml_diff>
--- a/slides/report/newStar/images/future.pptx
+++ b/slides/report/newStar/images/future.pptx
@@ -3841,7 +3841,7 @@
               <a:t>/</a:t>
             </a:r>
             <a:r>
-              <a:rPr lang="zh-CN" altLang="en-US" sz="1400" b="1"/>
+              <a:rPr lang="zh-CN" altLang="en-US" sz="1400" b="1" dirty="0"/>
               <a:t>规范性研究</a:t>
             </a:r>
             <a:endParaRPr lang="en-US" altLang="zh-CN" sz="1400" b="1" dirty="0"/>
@@ -4448,15 +4448,7 @@
           <a:p>
             <a:r>
               <a:rPr lang="zh-CN" altLang="en-US" sz="1400" b="1" dirty="0"/>
-              <a:t>发展新技术方法，引领</a:t>
-            </a:r>
-            <a:r>
-              <a:rPr lang="en-US" altLang="zh-CN" sz="1400" b="1" dirty="0"/>
-              <a:t>DA-RT</a:t>
-            </a:r>
-            <a:r>
-              <a:rPr lang="zh-CN" altLang="en-US" sz="1400" b="1" dirty="0"/>
-              <a:t>趋势</a:t>
+              <a:t>发展新技术方法，引领科学性研究</a:t>
             </a:r>
             <a:endParaRPr lang="en-US" altLang="zh-CN" sz="1400" b="1" dirty="0"/>
           </a:p>

</xml_diff>

<commit_message>
future plot real updated
</commit_message>
<xml_diff>
--- a/slides/report/newStar/images/future.pptx
+++ b/slides/report/newStar/images/future.pptx
@@ -5,8 +5,8 @@
     <p:sldMasterId id="2147483648" r:id="rId1"/>
   </p:sldMasterIdLst>
   <p:sldIdLst>
-    <p:sldId id="256" r:id="rId2"/>
-    <p:sldId id="258" r:id="rId3"/>
+    <p:sldId id="258" r:id="rId2"/>
+    <p:sldId id="256" r:id="rId3"/>
     <p:sldId id="257" r:id="rId4"/>
   </p:sldIdLst>
   <p:sldSz cx="12192000" cy="6858000"/>
@@ -3333,6 +3333,694 @@
 </file>
 
 <file path=ppt/slides/slide1.xml><?xml version="1.0" encoding="utf-8"?>
+<p:sld xmlns:a="http://schemas.openxmlformats.org/drawingml/2006/main" xmlns:r="http://schemas.openxmlformats.org/officeDocument/2006/relationships" xmlns:p="http://schemas.openxmlformats.org/presentationml/2006/main">
+  <p:cSld>
+    <p:spTree>
+      <p:nvGrpSpPr>
+        <p:cNvPr id="1" name=""/>
+        <p:cNvGrpSpPr/>
+        <p:nvPr/>
+      </p:nvGrpSpPr>
+      <p:grpSpPr>
+        <a:xfrm>
+          <a:off x="0" y="0"/>
+          <a:ext cx="0" cy="0"/>
+          <a:chOff x="0" y="0"/>
+          <a:chExt cx="0" cy="0"/>
+        </a:xfrm>
+      </p:grpSpPr>
+      <p:grpSp>
+        <p:nvGrpSpPr>
+          <p:cNvPr id="16" name="组合 15">
+            <a:extLst>
+              <a:ext uri="{FF2B5EF4-FFF2-40B4-BE49-F238E27FC236}">
+                <a16:creationId xmlns:a16="http://schemas.microsoft.com/office/drawing/2014/main" id="{BA24A0D0-465A-4FFF-9702-B87AAB39F45B}"/>
+              </a:ext>
+            </a:extLst>
+          </p:cNvPr>
+          <p:cNvGrpSpPr/>
+          <p:nvPr/>
+        </p:nvGrpSpPr>
+        <p:grpSpPr>
+          <a:xfrm>
+            <a:off x="1428836" y="1601923"/>
+            <a:ext cx="3047999" cy="2977661"/>
+            <a:chOff x="4700954" y="1512276"/>
+            <a:chExt cx="3047999" cy="2977661"/>
+          </a:xfrm>
+        </p:grpSpPr>
+        <p:sp>
+          <p:nvSpPr>
+            <p:cNvPr id="4" name="等腰三角形 3">
+              <a:extLst>
+                <a:ext uri="{FF2B5EF4-FFF2-40B4-BE49-F238E27FC236}">
+                  <a16:creationId xmlns:a16="http://schemas.microsoft.com/office/drawing/2014/main" id="{F8C0F247-C967-49AC-B29C-DD792602DA6A}"/>
+                </a:ext>
+              </a:extLst>
+            </p:cNvPr>
+            <p:cNvSpPr/>
+            <p:nvPr/>
+          </p:nvSpPr>
+          <p:spPr>
+            <a:xfrm>
+              <a:off x="4700954" y="1512276"/>
+              <a:ext cx="3047999" cy="2977661"/>
+            </a:xfrm>
+            <a:prstGeom prst="triangle">
+              <a:avLst/>
+            </a:prstGeom>
+          </p:spPr>
+          <p:style>
+            <a:lnRef idx="2">
+              <a:schemeClr val="dk1">
+                <a:shade val="50000"/>
+              </a:schemeClr>
+            </a:lnRef>
+            <a:fillRef idx="1">
+              <a:schemeClr val="dk1"/>
+            </a:fillRef>
+            <a:effectRef idx="0">
+              <a:schemeClr val="dk1"/>
+            </a:effectRef>
+            <a:fontRef idx="minor">
+              <a:schemeClr val="lt1"/>
+            </a:fontRef>
+          </p:style>
+          <p:txBody>
+            <a:bodyPr rtlCol="0" anchor="ctr"/>
+            <a:lstStyle/>
+            <a:p>
+              <a:pPr algn="ctr"/>
+              <a:endParaRPr lang="en-US"/>
+            </a:p>
+          </p:txBody>
+        </p:sp>
+        <p:sp>
+          <p:nvSpPr>
+            <p:cNvPr id="13" name="文本框 12">
+              <a:extLst>
+                <a:ext uri="{FF2B5EF4-FFF2-40B4-BE49-F238E27FC236}">
+                  <a16:creationId xmlns:a16="http://schemas.microsoft.com/office/drawing/2014/main" id="{67AFEABC-41E7-47E5-91FA-7FA112530CF6}"/>
+                </a:ext>
+              </a:extLst>
+            </p:cNvPr>
+            <p:cNvSpPr txBox="1"/>
+            <p:nvPr/>
+          </p:nvSpPr>
+          <p:spPr>
+            <a:xfrm>
+              <a:off x="5687071" y="2241613"/>
+              <a:ext cx="1075764" cy="861774"/>
+            </a:xfrm>
+            <a:prstGeom prst="rect">
+              <a:avLst/>
+            </a:prstGeom>
+            <a:noFill/>
+          </p:spPr>
+          <p:txBody>
+            <a:bodyPr wrap="square" rtlCol="0">
+              <a:spAutoFit/>
+            </a:bodyPr>
+            <a:lstStyle/>
+            <a:p>
+              <a:pPr algn="ctr"/>
+              <a:r>
+                <a:rPr lang="zh-CN" altLang="en-US" b="1" dirty="0">
+                  <a:solidFill>
+                    <a:srgbClr val="FFC000"/>
+                  </a:solidFill>
+                </a:rPr>
+                <a:t>学术</a:t>
+              </a:r>
+              <a:endParaRPr lang="en-US" altLang="zh-CN" b="1" dirty="0">
+                <a:solidFill>
+                  <a:srgbClr val="FFC000"/>
+                </a:solidFill>
+              </a:endParaRPr>
+            </a:p>
+            <a:p>
+              <a:pPr algn="ctr"/>
+              <a:r>
+                <a:rPr lang="zh-CN" altLang="en-US" sz="1600" dirty="0">
+                  <a:solidFill>
+                    <a:srgbClr val="FFC000"/>
+                  </a:solidFill>
+                </a:rPr>
+                <a:t>理论方法</a:t>
+              </a:r>
+              <a:endParaRPr lang="en-US" altLang="zh-CN" sz="1600" dirty="0">
+                <a:solidFill>
+                  <a:srgbClr val="FFC000"/>
+                </a:solidFill>
+              </a:endParaRPr>
+            </a:p>
+            <a:p>
+              <a:pPr algn="ctr"/>
+              <a:r>
+                <a:rPr lang="zh-CN" altLang="en-US" sz="1600" dirty="0">
+                  <a:solidFill>
+                    <a:srgbClr val="C00000"/>
+                  </a:solidFill>
+                </a:rPr>
+                <a:t>双循环</a:t>
+              </a:r>
+              <a:endParaRPr lang="en-US" sz="1600" dirty="0">
+                <a:solidFill>
+                  <a:srgbClr val="C00000"/>
+                </a:solidFill>
+              </a:endParaRPr>
+            </a:p>
+          </p:txBody>
+        </p:sp>
+        <p:sp>
+          <p:nvSpPr>
+            <p:cNvPr id="14" name="文本框 13">
+              <a:extLst>
+                <a:ext uri="{FF2B5EF4-FFF2-40B4-BE49-F238E27FC236}">
+                  <a16:creationId xmlns:a16="http://schemas.microsoft.com/office/drawing/2014/main" id="{DEC20DA7-BE4A-4847-AF26-7879CB536133}"/>
+                </a:ext>
+              </a:extLst>
+            </p:cNvPr>
+            <p:cNvSpPr txBox="1"/>
+            <p:nvPr/>
+          </p:nvSpPr>
+          <p:spPr>
+            <a:xfrm>
+              <a:off x="4897722" y="3615206"/>
+              <a:ext cx="1075764" cy="784830"/>
+            </a:xfrm>
+            <a:prstGeom prst="rect">
+              <a:avLst/>
+            </a:prstGeom>
+            <a:noFill/>
+          </p:spPr>
+          <p:txBody>
+            <a:bodyPr wrap="square" rtlCol="0">
+              <a:spAutoFit/>
+            </a:bodyPr>
+            <a:lstStyle/>
+            <a:p>
+              <a:pPr algn="ctr"/>
+              <a:r>
+                <a:rPr lang="zh-CN" altLang="en-US" sz="1500" b="1" dirty="0">
+                  <a:solidFill>
+                    <a:srgbClr val="FFC000"/>
+                  </a:solidFill>
+                </a:rPr>
+                <a:t>教学</a:t>
+              </a:r>
+              <a:endParaRPr lang="en-US" altLang="zh-CN" sz="1500" b="1" dirty="0">
+                <a:solidFill>
+                  <a:srgbClr val="FFC000"/>
+                </a:solidFill>
+              </a:endParaRPr>
+            </a:p>
+            <a:p>
+              <a:pPr algn="ctr"/>
+              <a:r>
+                <a:rPr lang="zh-CN" altLang="en-US" sz="1500" dirty="0">
+                  <a:solidFill>
+                    <a:srgbClr val="FFC000"/>
+                  </a:solidFill>
+                </a:rPr>
+                <a:t>课内课外</a:t>
+              </a:r>
+              <a:endParaRPr lang="en-US" altLang="zh-CN" sz="1500" dirty="0">
+                <a:solidFill>
+                  <a:srgbClr val="FFC000"/>
+                </a:solidFill>
+              </a:endParaRPr>
+            </a:p>
+            <a:p>
+              <a:pPr algn="ctr"/>
+              <a:r>
+                <a:rPr lang="zh-CN" altLang="en-US" sz="1500" dirty="0">
+                  <a:solidFill>
+                    <a:srgbClr val="C00000"/>
+                  </a:solidFill>
+                </a:rPr>
+                <a:t>双轮动</a:t>
+              </a:r>
+              <a:endParaRPr lang="en-US" sz="1500" dirty="0">
+                <a:solidFill>
+                  <a:srgbClr val="C00000"/>
+                </a:solidFill>
+              </a:endParaRPr>
+            </a:p>
+          </p:txBody>
+        </p:sp>
+        <p:sp>
+          <p:nvSpPr>
+            <p:cNvPr id="15" name="文本框 14">
+              <a:extLst>
+                <a:ext uri="{FF2B5EF4-FFF2-40B4-BE49-F238E27FC236}">
+                  <a16:creationId xmlns:a16="http://schemas.microsoft.com/office/drawing/2014/main" id="{B70F9F28-ECD4-4DA7-8633-0C9492DA4493}"/>
+                </a:ext>
+              </a:extLst>
+            </p:cNvPr>
+            <p:cNvSpPr txBox="1"/>
+            <p:nvPr/>
+          </p:nvSpPr>
+          <p:spPr>
+            <a:xfrm>
+              <a:off x="6544983" y="3619844"/>
+              <a:ext cx="1075764" cy="784830"/>
+            </a:xfrm>
+            <a:prstGeom prst="rect">
+              <a:avLst/>
+            </a:prstGeom>
+            <a:noFill/>
+          </p:spPr>
+          <p:txBody>
+            <a:bodyPr wrap="square" rtlCol="0">
+              <a:spAutoFit/>
+            </a:bodyPr>
+            <a:lstStyle/>
+            <a:p>
+              <a:pPr algn="ctr"/>
+              <a:r>
+                <a:rPr lang="zh-CN" altLang="en-US" sz="1500" b="1" dirty="0">
+                  <a:solidFill>
+                    <a:srgbClr val="FFC000"/>
+                  </a:solidFill>
+                </a:rPr>
+                <a:t>服务</a:t>
+              </a:r>
+              <a:endParaRPr lang="en-US" altLang="zh-CN" sz="1500" b="1" dirty="0">
+                <a:solidFill>
+                  <a:srgbClr val="FFC000"/>
+                </a:solidFill>
+              </a:endParaRPr>
+            </a:p>
+            <a:p>
+              <a:pPr algn="ctr"/>
+              <a:r>
+                <a:rPr lang="zh-CN" altLang="en-US" sz="1500" dirty="0">
+                  <a:solidFill>
+                    <a:srgbClr val="FFC000"/>
+                  </a:solidFill>
+                </a:rPr>
+                <a:t>又红又专</a:t>
+              </a:r>
+              <a:r>
+                <a:rPr lang="zh-CN" altLang="en-US" sz="1500" dirty="0">
+                  <a:solidFill>
+                    <a:srgbClr val="C00000"/>
+                  </a:solidFill>
+                </a:rPr>
+                <a:t>双肩挑</a:t>
+              </a:r>
+              <a:endParaRPr lang="en-US" sz="1500" dirty="0">
+                <a:solidFill>
+                  <a:srgbClr val="C00000"/>
+                </a:solidFill>
+              </a:endParaRPr>
+            </a:p>
+          </p:txBody>
+        </p:sp>
+      </p:grpSp>
+      <p:sp>
+        <p:nvSpPr>
+          <p:cNvPr id="17" name="文本框 16">
+            <a:extLst>
+              <a:ext uri="{FF2B5EF4-FFF2-40B4-BE49-F238E27FC236}">
+                <a16:creationId xmlns:a16="http://schemas.microsoft.com/office/drawing/2014/main" id="{FD08FFAE-37B3-4A34-930F-1F838B29E8FA}"/>
+              </a:ext>
+            </a:extLst>
+          </p:cNvPr>
+          <p:cNvSpPr txBox="1"/>
+          <p:nvPr/>
+        </p:nvSpPr>
+        <p:spPr>
+          <a:xfrm>
+            <a:off x="4028599" y="1935195"/>
+            <a:ext cx="4438565" cy="1384995"/>
+          </a:xfrm>
+          <a:prstGeom prst="rect">
+            <a:avLst/>
+          </a:prstGeom>
+          <a:noFill/>
+        </p:spPr>
+        <p:txBody>
+          <a:bodyPr wrap="square" rtlCol="0">
+            <a:spAutoFit/>
+          </a:bodyPr>
+          <a:lstStyle/>
+          <a:p>
+            <a:r>
+              <a:rPr lang="zh-CN" altLang="en-US" sz="1400" b="1" dirty="0"/>
+              <a:t>推进理解国家治理效能理论创新</a:t>
+            </a:r>
+            <a:endParaRPr lang="en-US" altLang="zh-CN" sz="1400" b="1" dirty="0"/>
+          </a:p>
+          <a:p>
+            <a:pPr marL="285750" indent="-285750">
+              <a:buFont typeface="Arial" panose="020B0604020202020204" pitchFamily="34" charset="0"/>
+              <a:buChar char="•"/>
+            </a:pPr>
+            <a:r>
+              <a:rPr lang="zh-CN" altLang="en-US" sz="1400" dirty="0"/>
+              <a:t>政治认知：国自科、北京社科等</a:t>
+            </a:r>
+            <a:endParaRPr lang="en-US" altLang="zh-CN" sz="1400" dirty="0"/>
+          </a:p>
+          <a:p>
+            <a:pPr marL="285750" indent="-285750">
+              <a:buFont typeface="Arial" panose="020B0604020202020204" pitchFamily="34" charset="0"/>
+              <a:buChar char="•"/>
+            </a:pPr>
+            <a:r>
+              <a:rPr lang="zh-CN" altLang="en-US" sz="1400" dirty="0"/>
+              <a:t>政治语言学：</a:t>
+            </a:r>
+            <a:r>
+              <a:rPr lang="zh-CN" altLang="en-US" sz="1400" b="1" dirty="0">
+                <a:solidFill>
+                  <a:srgbClr val="C00000"/>
+                </a:solidFill>
+              </a:rPr>
+              <a:t>英文专著</a:t>
+            </a:r>
+            <a:r>
+              <a:rPr lang="zh-CN" altLang="en-US" sz="1400" dirty="0"/>
+              <a:t>（已与</a:t>
+            </a:r>
+            <a:r>
+              <a:rPr lang="en-US" altLang="zh-CN" sz="1400" dirty="0"/>
+              <a:t>Springer</a:t>
+            </a:r>
+            <a:r>
+              <a:rPr lang="zh-CN" altLang="en-US" sz="1400" dirty="0"/>
+              <a:t>出版社签约）</a:t>
+            </a:r>
+            <a:endParaRPr lang="en-US" altLang="zh-CN" sz="1400" dirty="0"/>
+          </a:p>
+          <a:p>
+            <a:r>
+              <a:rPr lang="zh-CN" altLang="en-US" sz="1400" b="1" dirty="0"/>
+              <a:t>发展新技术方法，引领科学性研究</a:t>
+            </a:r>
+            <a:endParaRPr lang="en-US" altLang="zh-CN" sz="1400" b="1" dirty="0"/>
+          </a:p>
+          <a:p>
+            <a:pPr marL="285750" indent="-285750">
+              <a:buFont typeface="Arial" panose="020B0604020202020204" pitchFamily="34" charset="0"/>
+              <a:buChar char="•"/>
+            </a:pPr>
+            <a:r>
+              <a:rPr lang="zh-CN" altLang="en-US" sz="1400" dirty="0"/>
+              <a:t>公共舆论动态比较</a:t>
+            </a:r>
+            <a:r>
+              <a:rPr lang="en-US" altLang="zh-CN" sz="1400" dirty="0"/>
+              <a:t>(DCPO)</a:t>
+            </a:r>
+            <a:r>
+              <a:rPr lang="zh-CN" altLang="en-US" sz="1400" b="1" dirty="0">
+                <a:solidFill>
+                  <a:srgbClr val="C00000"/>
+                </a:solidFill>
+              </a:rPr>
+              <a:t>国际合作项目</a:t>
+            </a:r>
+            <a:endParaRPr lang="en-US" altLang="zh-CN" sz="1400" b="1" dirty="0">
+              <a:solidFill>
+                <a:srgbClr val="C00000"/>
+              </a:solidFill>
+            </a:endParaRPr>
+          </a:p>
+          <a:p>
+            <a:pPr marL="285750" indent="-285750">
+              <a:buFont typeface="Arial" panose="020B0604020202020204" pitchFamily="34" charset="0"/>
+              <a:buChar char="•"/>
+            </a:pPr>
+            <a:r>
+              <a:rPr lang="zh-CN" altLang="en-US" sz="1400" dirty="0"/>
+              <a:t>“政治概念塑造与扩散”大数据与实验研究系列</a:t>
+            </a:r>
+            <a:endParaRPr lang="en-US" sz="1400" dirty="0"/>
+          </a:p>
+        </p:txBody>
+      </p:sp>
+      <p:sp>
+        <p:nvSpPr>
+          <p:cNvPr id="18" name="文本框 17">
+            <a:extLst>
+              <a:ext uri="{FF2B5EF4-FFF2-40B4-BE49-F238E27FC236}">
+                <a16:creationId xmlns:a16="http://schemas.microsoft.com/office/drawing/2014/main" id="{A4BBFF0F-2F64-40C9-86BD-3C4899514A83}"/>
+              </a:ext>
+            </a:extLst>
+          </p:cNvPr>
+          <p:cNvSpPr txBox="1"/>
+          <p:nvPr/>
+        </p:nvSpPr>
+        <p:spPr>
+          <a:xfrm>
+            <a:off x="1572269" y="4779023"/>
+            <a:ext cx="4936108" cy="954107"/>
+          </a:xfrm>
+          <a:prstGeom prst="rect">
+            <a:avLst/>
+          </a:prstGeom>
+          <a:noFill/>
+        </p:spPr>
+        <p:txBody>
+          <a:bodyPr wrap="square" rtlCol="0">
+            <a:spAutoFit/>
+          </a:bodyPr>
+          <a:lstStyle/>
+          <a:p>
+            <a:r>
+              <a:rPr lang="zh-CN" altLang="en-US" sz="1400" b="1" dirty="0"/>
+              <a:t>推进教学改革、出版高质量前沿教材</a:t>
+            </a:r>
+            <a:endParaRPr lang="en-US" altLang="zh-CN" sz="1400" b="1" dirty="0"/>
+          </a:p>
+          <a:p>
+            <a:pPr marL="285750" indent="-285750">
+              <a:buFont typeface="Arial" panose="020B0604020202020204" pitchFamily="34" charset="0"/>
+              <a:buChar char="•"/>
+            </a:pPr>
+            <a:r>
+              <a:rPr lang="zh-CN" altLang="en-US" sz="1400" dirty="0"/>
+              <a:t>打造精品专业课、推进教改项目</a:t>
+            </a:r>
+            <a:endParaRPr lang="en-US" altLang="zh-CN" sz="1400" dirty="0"/>
+          </a:p>
+          <a:p>
+            <a:pPr marL="285750" indent="-285750">
+              <a:buFont typeface="Arial" panose="020B0604020202020204" pitchFamily="34" charset="0"/>
+              <a:buChar char="•"/>
+            </a:pPr>
+            <a:r>
+              <a:rPr lang="zh-CN" altLang="en-US" sz="1400" dirty="0"/>
+              <a:t>清华</a:t>
+            </a:r>
+            <a:r>
+              <a:rPr lang="zh-CN" altLang="en-US" sz="1400" b="1" dirty="0">
+                <a:solidFill>
+                  <a:srgbClr val="C00000"/>
+                </a:solidFill>
+              </a:rPr>
+              <a:t>教师培训评估专家组</a:t>
+            </a:r>
+            <a:r>
+              <a:rPr lang="zh-CN" altLang="en-US" sz="1400" dirty="0"/>
+              <a:t>工作</a:t>
+            </a:r>
+            <a:endParaRPr lang="en-US" altLang="zh-CN" sz="1400" dirty="0"/>
+          </a:p>
+          <a:p>
+            <a:pPr marL="285750" indent="-285750">
+              <a:buFont typeface="Arial" panose="020B0604020202020204" pitchFamily="34" charset="0"/>
+              <a:buChar char="•"/>
+            </a:pPr>
+            <a:r>
+              <a:rPr lang="zh-CN" altLang="en-US" sz="1400" dirty="0"/>
+              <a:t>新文科</a:t>
+            </a:r>
+            <a:r>
+              <a:rPr lang="zh-CN" altLang="en-US" sz="1400" b="1" dirty="0">
+                <a:solidFill>
+                  <a:srgbClr val="C00000"/>
+                </a:solidFill>
+              </a:rPr>
+              <a:t>教材</a:t>
+            </a:r>
+            <a:r>
+              <a:rPr lang="zh-CN" altLang="en-US" sz="1400" dirty="0"/>
+              <a:t>（已与重庆大学出版社签约，“万卷方法”系列）</a:t>
+            </a:r>
+            <a:endParaRPr lang="en-US" altLang="zh-CN" sz="1400" dirty="0"/>
+          </a:p>
+        </p:txBody>
+      </p:sp>
+      <p:sp>
+        <p:nvSpPr>
+          <p:cNvPr id="19" name="文本框 18">
+            <a:extLst>
+              <a:ext uri="{FF2B5EF4-FFF2-40B4-BE49-F238E27FC236}">
+                <a16:creationId xmlns:a16="http://schemas.microsoft.com/office/drawing/2014/main" id="{FE38D626-E0AE-4C0C-B6A3-94650C8DBF89}"/>
+              </a:ext>
+            </a:extLst>
+          </p:cNvPr>
+          <p:cNvSpPr txBox="1"/>
+          <p:nvPr/>
+        </p:nvSpPr>
+        <p:spPr>
+          <a:xfrm>
+            <a:off x="4544071" y="3665185"/>
+            <a:ext cx="4223412" cy="738664"/>
+          </a:xfrm>
+          <a:prstGeom prst="rect">
+            <a:avLst/>
+          </a:prstGeom>
+          <a:noFill/>
+        </p:spPr>
+        <p:txBody>
+          <a:bodyPr wrap="square" rtlCol="0">
+            <a:spAutoFit/>
+          </a:bodyPr>
+          <a:lstStyle/>
+          <a:p>
+            <a:r>
+              <a:rPr lang="zh-CN" altLang="en-US" sz="1400" b="1" dirty="0"/>
+              <a:t>助力院校发展</a:t>
+            </a:r>
+            <a:endParaRPr lang="en-US" altLang="zh-CN" sz="1400" b="1" dirty="0"/>
+          </a:p>
+          <a:p>
+            <a:pPr marL="285750" indent="-285750">
+              <a:buFont typeface="Arial" panose="020B0604020202020204" pitchFamily="34" charset="0"/>
+              <a:buChar char="•"/>
+            </a:pPr>
+            <a:r>
+              <a:rPr lang="zh-CN" altLang="en-US" sz="1400" dirty="0"/>
+              <a:t>研工组：落实意识形态引领、心理问题疏导</a:t>
+            </a:r>
+            <a:endParaRPr lang="en-US" altLang="zh-CN" sz="1400" dirty="0"/>
+          </a:p>
+          <a:p>
+            <a:pPr marL="285750" indent="-285750">
+              <a:buFont typeface="Arial" panose="020B0604020202020204" pitchFamily="34" charset="0"/>
+              <a:buChar char="•"/>
+            </a:pPr>
+            <a:r>
+              <a:rPr lang="zh-CN" altLang="en-US" sz="1400" dirty="0"/>
+              <a:t>计算社科平台：计算社会科学</a:t>
+            </a:r>
+            <a:r>
+              <a:rPr lang="zh-CN" altLang="en-US" sz="1400" b="1" dirty="0">
+                <a:solidFill>
+                  <a:srgbClr val="C00000"/>
+                </a:solidFill>
+              </a:rPr>
+              <a:t>编程语言证书项目</a:t>
+            </a:r>
+            <a:endParaRPr lang="en-US" altLang="zh-CN" sz="1400" b="1" dirty="0">
+              <a:solidFill>
+                <a:srgbClr val="C00000"/>
+              </a:solidFill>
+            </a:endParaRPr>
+          </a:p>
+        </p:txBody>
+      </p:sp>
+      <p:sp>
+        <p:nvSpPr>
+          <p:cNvPr id="12" name="等腰三角形 11">
+            <a:extLst>
+              <a:ext uri="{FF2B5EF4-FFF2-40B4-BE49-F238E27FC236}">
+                <a16:creationId xmlns:a16="http://schemas.microsoft.com/office/drawing/2014/main" id="{BF855D58-4C25-4102-B91A-27B5029486A1}"/>
+              </a:ext>
+            </a:extLst>
+          </p:cNvPr>
+          <p:cNvSpPr/>
+          <p:nvPr/>
+        </p:nvSpPr>
+        <p:spPr>
+          <a:xfrm rot="10800000">
+            <a:off x="2088442" y="3320190"/>
+            <a:ext cx="1749655" cy="1259384"/>
+          </a:xfrm>
+          <a:prstGeom prst="triangle">
+            <a:avLst/>
+          </a:prstGeom>
+        </p:spPr>
+        <p:style>
+          <a:lnRef idx="2">
+            <a:schemeClr val="accent4">
+              <a:shade val="50000"/>
+            </a:schemeClr>
+          </a:lnRef>
+          <a:fillRef idx="1">
+            <a:schemeClr val="accent4"/>
+          </a:fillRef>
+          <a:effectRef idx="0">
+            <a:schemeClr val="accent4"/>
+          </a:effectRef>
+          <a:fontRef idx="minor">
+            <a:schemeClr val="lt1"/>
+          </a:fontRef>
+        </p:style>
+        <p:txBody>
+          <a:bodyPr rtlCol="0" anchor="ctr"/>
+          <a:lstStyle/>
+          <a:p>
+            <a:pPr algn="ctr"/>
+            <a:endParaRPr lang="en-US"/>
+          </a:p>
+        </p:txBody>
+      </p:sp>
+      <p:sp>
+        <p:nvSpPr>
+          <p:cNvPr id="22" name="文本框 21">
+            <a:extLst>
+              <a:ext uri="{FF2B5EF4-FFF2-40B4-BE49-F238E27FC236}">
+                <a16:creationId xmlns:a16="http://schemas.microsoft.com/office/drawing/2014/main" id="{7F9D3D17-CA24-4648-81D8-2F9EB4E9FE42}"/>
+              </a:ext>
+            </a:extLst>
+          </p:cNvPr>
+          <p:cNvSpPr txBox="1"/>
+          <p:nvPr/>
+        </p:nvSpPr>
+        <p:spPr>
+          <a:xfrm>
+            <a:off x="2615780" y="3443134"/>
+            <a:ext cx="667628" cy="677108"/>
+          </a:xfrm>
+          <a:prstGeom prst="rect">
+            <a:avLst/>
+          </a:prstGeom>
+          <a:noFill/>
+        </p:spPr>
+        <p:txBody>
+          <a:bodyPr wrap="square" rtlCol="0">
+            <a:spAutoFit/>
+          </a:bodyPr>
+          <a:lstStyle/>
+          <a:p>
+            <a:r>
+              <a:rPr lang="zh-CN" altLang="en-US" sz="1900" b="1" dirty="0"/>
+              <a:t>全面发展</a:t>
+            </a:r>
+            <a:endParaRPr lang="en-US" sz="1900" b="1" dirty="0"/>
+          </a:p>
+        </p:txBody>
+      </p:sp>
+    </p:spTree>
+    <p:extLst>
+      <p:ext uri="{BB962C8B-B14F-4D97-AF65-F5344CB8AC3E}">
+        <p14:creationId xmlns:p14="http://schemas.microsoft.com/office/powerpoint/2010/main" val="3131323880"/>
+      </p:ext>
+    </p:extLst>
+  </p:cSld>
+  <p:clrMapOvr>
+    <a:masterClrMapping/>
+  </p:clrMapOvr>
+</p:sld>
+</file>
+
+<file path=ppt/slides/slide2.xml><?xml version="1.0" encoding="utf-8"?>
 <p:sld xmlns:a="http://schemas.openxmlformats.org/drawingml/2006/main" xmlns:r="http://schemas.openxmlformats.org/officeDocument/2006/relationships" xmlns:p="http://schemas.openxmlformats.org/presentationml/2006/main">
   <p:cSld>
     <p:spTree>
@@ -4062,694 +4750,6 @@
 </p:sld>
 </file>
 
-<file path=ppt/slides/slide2.xml><?xml version="1.0" encoding="utf-8"?>
-<p:sld xmlns:a="http://schemas.openxmlformats.org/drawingml/2006/main" xmlns:r="http://schemas.openxmlformats.org/officeDocument/2006/relationships" xmlns:p="http://schemas.openxmlformats.org/presentationml/2006/main">
-  <p:cSld>
-    <p:spTree>
-      <p:nvGrpSpPr>
-        <p:cNvPr id="1" name=""/>
-        <p:cNvGrpSpPr/>
-        <p:nvPr/>
-      </p:nvGrpSpPr>
-      <p:grpSpPr>
-        <a:xfrm>
-          <a:off x="0" y="0"/>
-          <a:ext cx="0" cy="0"/>
-          <a:chOff x="0" y="0"/>
-          <a:chExt cx="0" cy="0"/>
-        </a:xfrm>
-      </p:grpSpPr>
-      <p:grpSp>
-        <p:nvGrpSpPr>
-          <p:cNvPr id="16" name="组合 15">
-            <a:extLst>
-              <a:ext uri="{FF2B5EF4-FFF2-40B4-BE49-F238E27FC236}">
-                <a16:creationId xmlns:a16="http://schemas.microsoft.com/office/drawing/2014/main" id="{BA24A0D0-465A-4FFF-9702-B87AAB39F45B}"/>
-              </a:ext>
-            </a:extLst>
-          </p:cNvPr>
-          <p:cNvGrpSpPr/>
-          <p:nvPr/>
-        </p:nvGrpSpPr>
-        <p:grpSpPr>
-          <a:xfrm>
-            <a:off x="1428836" y="1601923"/>
-            <a:ext cx="3047999" cy="2977661"/>
-            <a:chOff x="4700954" y="1512276"/>
-            <a:chExt cx="3047999" cy="2977661"/>
-          </a:xfrm>
-        </p:grpSpPr>
-        <p:sp>
-          <p:nvSpPr>
-            <p:cNvPr id="4" name="等腰三角形 3">
-              <a:extLst>
-                <a:ext uri="{FF2B5EF4-FFF2-40B4-BE49-F238E27FC236}">
-                  <a16:creationId xmlns:a16="http://schemas.microsoft.com/office/drawing/2014/main" id="{F8C0F247-C967-49AC-B29C-DD792602DA6A}"/>
-                </a:ext>
-              </a:extLst>
-            </p:cNvPr>
-            <p:cNvSpPr/>
-            <p:nvPr/>
-          </p:nvSpPr>
-          <p:spPr>
-            <a:xfrm>
-              <a:off x="4700954" y="1512276"/>
-              <a:ext cx="3047999" cy="2977661"/>
-            </a:xfrm>
-            <a:prstGeom prst="triangle">
-              <a:avLst/>
-            </a:prstGeom>
-          </p:spPr>
-          <p:style>
-            <a:lnRef idx="2">
-              <a:schemeClr val="dk1">
-                <a:shade val="50000"/>
-              </a:schemeClr>
-            </a:lnRef>
-            <a:fillRef idx="1">
-              <a:schemeClr val="dk1"/>
-            </a:fillRef>
-            <a:effectRef idx="0">
-              <a:schemeClr val="dk1"/>
-            </a:effectRef>
-            <a:fontRef idx="minor">
-              <a:schemeClr val="lt1"/>
-            </a:fontRef>
-          </p:style>
-          <p:txBody>
-            <a:bodyPr rtlCol="0" anchor="ctr"/>
-            <a:lstStyle/>
-            <a:p>
-              <a:pPr algn="ctr"/>
-              <a:endParaRPr lang="en-US"/>
-            </a:p>
-          </p:txBody>
-        </p:sp>
-        <p:sp>
-          <p:nvSpPr>
-            <p:cNvPr id="13" name="文本框 12">
-              <a:extLst>
-                <a:ext uri="{FF2B5EF4-FFF2-40B4-BE49-F238E27FC236}">
-                  <a16:creationId xmlns:a16="http://schemas.microsoft.com/office/drawing/2014/main" id="{67AFEABC-41E7-47E5-91FA-7FA112530CF6}"/>
-                </a:ext>
-              </a:extLst>
-            </p:cNvPr>
-            <p:cNvSpPr txBox="1"/>
-            <p:nvPr/>
-          </p:nvSpPr>
-          <p:spPr>
-            <a:xfrm>
-              <a:off x="5687071" y="2241613"/>
-              <a:ext cx="1075764" cy="861774"/>
-            </a:xfrm>
-            <a:prstGeom prst="rect">
-              <a:avLst/>
-            </a:prstGeom>
-            <a:noFill/>
-          </p:spPr>
-          <p:txBody>
-            <a:bodyPr wrap="square" rtlCol="0">
-              <a:spAutoFit/>
-            </a:bodyPr>
-            <a:lstStyle/>
-            <a:p>
-              <a:pPr algn="ctr"/>
-              <a:r>
-                <a:rPr lang="zh-CN" altLang="en-US" b="1" dirty="0">
-                  <a:solidFill>
-                    <a:srgbClr val="FFC000"/>
-                  </a:solidFill>
-                </a:rPr>
-                <a:t>学术</a:t>
-              </a:r>
-              <a:endParaRPr lang="en-US" altLang="zh-CN" b="1" dirty="0">
-                <a:solidFill>
-                  <a:srgbClr val="FFC000"/>
-                </a:solidFill>
-              </a:endParaRPr>
-            </a:p>
-            <a:p>
-              <a:pPr algn="ctr"/>
-              <a:r>
-                <a:rPr lang="zh-CN" altLang="en-US" sz="1600" dirty="0">
-                  <a:solidFill>
-                    <a:srgbClr val="FFC000"/>
-                  </a:solidFill>
-                </a:rPr>
-                <a:t>理论方法</a:t>
-              </a:r>
-              <a:endParaRPr lang="en-US" altLang="zh-CN" sz="1600" dirty="0">
-                <a:solidFill>
-                  <a:srgbClr val="FFC000"/>
-                </a:solidFill>
-              </a:endParaRPr>
-            </a:p>
-            <a:p>
-              <a:pPr algn="ctr"/>
-              <a:r>
-                <a:rPr lang="zh-CN" altLang="en-US" sz="1600" dirty="0">
-                  <a:solidFill>
-                    <a:srgbClr val="C00000"/>
-                  </a:solidFill>
-                </a:rPr>
-                <a:t>双循环</a:t>
-              </a:r>
-              <a:endParaRPr lang="en-US" sz="1600" dirty="0">
-                <a:solidFill>
-                  <a:srgbClr val="C00000"/>
-                </a:solidFill>
-              </a:endParaRPr>
-            </a:p>
-          </p:txBody>
-        </p:sp>
-        <p:sp>
-          <p:nvSpPr>
-            <p:cNvPr id="14" name="文本框 13">
-              <a:extLst>
-                <a:ext uri="{FF2B5EF4-FFF2-40B4-BE49-F238E27FC236}">
-                  <a16:creationId xmlns:a16="http://schemas.microsoft.com/office/drawing/2014/main" id="{DEC20DA7-BE4A-4847-AF26-7879CB536133}"/>
-                </a:ext>
-              </a:extLst>
-            </p:cNvPr>
-            <p:cNvSpPr txBox="1"/>
-            <p:nvPr/>
-          </p:nvSpPr>
-          <p:spPr>
-            <a:xfrm>
-              <a:off x="4897722" y="3615206"/>
-              <a:ext cx="1075764" cy="784830"/>
-            </a:xfrm>
-            <a:prstGeom prst="rect">
-              <a:avLst/>
-            </a:prstGeom>
-            <a:noFill/>
-          </p:spPr>
-          <p:txBody>
-            <a:bodyPr wrap="square" rtlCol="0">
-              <a:spAutoFit/>
-            </a:bodyPr>
-            <a:lstStyle/>
-            <a:p>
-              <a:pPr algn="ctr"/>
-              <a:r>
-                <a:rPr lang="zh-CN" altLang="en-US" sz="1500" b="1" dirty="0">
-                  <a:solidFill>
-                    <a:srgbClr val="FFC000"/>
-                  </a:solidFill>
-                </a:rPr>
-                <a:t>教学</a:t>
-              </a:r>
-              <a:endParaRPr lang="en-US" altLang="zh-CN" sz="1500" b="1" dirty="0">
-                <a:solidFill>
-                  <a:srgbClr val="FFC000"/>
-                </a:solidFill>
-              </a:endParaRPr>
-            </a:p>
-            <a:p>
-              <a:pPr algn="ctr"/>
-              <a:r>
-                <a:rPr lang="zh-CN" altLang="en-US" sz="1500" dirty="0">
-                  <a:solidFill>
-                    <a:srgbClr val="FFC000"/>
-                  </a:solidFill>
-                </a:rPr>
-                <a:t>课内课外</a:t>
-              </a:r>
-              <a:endParaRPr lang="en-US" altLang="zh-CN" sz="1500" dirty="0">
-                <a:solidFill>
-                  <a:srgbClr val="FFC000"/>
-                </a:solidFill>
-              </a:endParaRPr>
-            </a:p>
-            <a:p>
-              <a:pPr algn="ctr"/>
-              <a:r>
-                <a:rPr lang="zh-CN" altLang="en-US" sz="1500" dirty="0">
-                  <a:solidFill>
-                    <a:srgbClr val="C00000"/>
-                  </a:solidFill>
-                </a:rPr>
-                <a:t>双轮动</a:t>
-              </a:r>
-              <a:endParaRPr lang="en-US" sz="1500" dirty="0">
-                <a:solidFill>
-                  <a:srgbClr val="C00000"/>
-                </a:solidFill>
-              </a:endParaRPr>
-            </a:p>
-          </p:txBody>
-        </p:sp>
-        <p:sp>
-          <p:nvSpPr>
-            <p:cNvPr id="15" name="文本框 14">
-              <a:extLst>
-                <a:ext uri="{FF2B5EF4-FFF2-40B4-BE49-F238E27FC236}">
-                  <a16:creationId xmlns:a16="http://schemas.microsoft.com/office/drawing/2014/main" id="{B70F9F28-ECD4-4DA7-8633-0C9492DA4493}"/>
-                </a:ext>
-              </a:extLst>
-            </p:cNvPr>
-            <p:cNvSpPr txBox="1"/>
-            <p:nvPr/>
-          </p:nvSpPr>
-          <p:spPr>
-            <a:xfrm>
-              <a:off x="6544983" y="3619844"/>
-              <a:ext cx="1075764" cy="784830"/>
-            </a:xfrm>
-            <a:prstGeom prst="rect">
-              <a:avLst/>
-            </a:prstGeom>
-            <a:noFill/>
-          </p:spPr>
-          <p:txBody>
-            <a:bodyPr wrap="square" rtlCol="0">
-              <a:spAutoFit/>
-            </a:bodyPr>
-            <a:lstStyle/>
-            <a:p>
-              <a:pPr algn="ctr"/>
-              <a:r>
-                <a:rPr lang="zh-CN" altLang="en-US" sz="1500" b="1" dirty="0">
-                  <a:solidFill>
-                    <a:srgbClr val="FFC000"/>
-                  </a:solidFill>
-                </a:rPr>
-                <a:t>服务</a:t>
-              </a:r>
-              <a:endParaRPr lang="en-US" altLang="zh-CN" sz="1500" b="1" dirty="0">
-                <a:solidFill>
-                  <a:srgbClr val="FFC000"/>
-                </a:solidFill>
-              </a:endParaRPr>
-            </a:p>
-            <a:p>
-              <a:pPr algn="ctr"/>
-              <a:r>
-                <a:rPr lang="zh-CN" altLang="en-US" sz="1500" dirty="0">
-                  <a:solidFill>
-                    <a:srgbClr val="FFC000"/>
-                  </a:solidFill>
-                </a:rPr>
-                <a:t>又红又专</a:t>
-              </a:r>
-              <a:r>
-                <a:rPr lang="zh-CN" altLang="en-US" sz="1500" dirty="0">
-                  <a:solidFill>
-                    <a:srgbClr val="C00000"/>
-                  </a:solidFill>
-                </a:rPr>
-                <a:t>双肩挑</a:t>
-              </a:r>
-              <a:endParaRPr lang="en-US" sz="1500" dirty="0">
-                <a:solidFill>
-                  <a:srgbClr val="C00000"/>
-                </a:solidFill>
-              </a:endParaRPr>
-            </a:p>
-          </p:txBody>
-        </p:sp>
-      </p:grpSp>
-      <p:sp>
-        <p:nvSpPr>
-          <p:cNvPr id="17" name="文本框 16">
-            <a:extLst>
-              <a:ext uri="{FF2B5EF4-FFF2-40B4-BE49-F238E27FC236}">
-                <a16:creationId xmlns:a16="http://schemas.microsoft.com/office/drawing/2014/main" id="{FD08FFAE-37B3-4A34-930F-1F838B29E8FA}"/>
-              </a:ext>
-            </a:extLst>
-          </p:cNvPr>
-          <p:cNvSpPr txBox="1"/>
-          <p:nvPr/>
-        </p:nvSpPr>
-        <p:spPr>
-          <a:xfrm>
-            <a:off x="4028599" y="1935195"/>
-            <a:ext cx="4438565" cy="1384995"/>
-          </a:xfrm>
-          <a:prstGeom prst="rect">
-            <a:avLst/>
-          </a:prstGeom>
-          <a:noFill/>
-        </p:spPr>
-        <p:txBody>
-          <a:bodyPr wrap="square" rtlCol="0">
-            <a:spAutoFit/>
-          </a:bodyPr>
-          <a:lstStyle/>
-          <a:p>
-            <a:r>
-              <a:rPr lang="zh-CN" altLang="en-US" sz="1400" b="1" dirty="0"/>
-              <a:t>推进理解国家治理效能理论创新</a:t>
-            </a:r>
-            <a:endParaRPr lang="en-US" altLang="zh-CN" sz="1400" b="1" dirty="0"/>
-          </a:p>
-          <a:p>
-            <a:pPr marL="285750" indent="-285750">
-              <a:buFont typeface="Arial" panose="020B0604020202020204" pitchFamily="34" charset="0"/>
-              <a:buChar char="•"/>
-            </a:pPr>
-            <a:r>
-              <a:rPr lang="zh-CN" altLang="en-US" sz="1400" dirty="0"/>
-              <a:t>政治认知：国自科、北京社科等</a:t>
-            </a:r>
-            <a:endParaRPr lang="en-US" altLang="zh-CN" sz="1400" dirty="0"/>
-          </a:p>
-          <a:p>
-            <a:pPr marL="285750" indent="-285750">
-              <a:buFont typeface="Arial" panose="020B0604020202020204" pitchFamily="34" charset="0"/>
-              <a:buChar char="•"/>
-            </a:pPr>
-            <a:r>
-              <a:rPr lang="zh-CN" altLang="en-US" sz="1400" dirty="0"/>
-              <a:t>政治语言学：</a:t>
-            </a:r>
-            <a:r>
-              <a:rPr lang="zh-CN" altLang="en-US" sz="1400" b="1" dirty="0">
-                <a:solidFill>
-                  <a:srgbClr val="C00000"/>
-                </a:solidFill>
-              </a:rPr>
-              <a:t>英文专著</a:t>
-            </a:r>
-            <a:r>
-              <a:rPr lang="zh-CN" altLang="en-US" sz="1400" dirty="0"/>
-              <a:t>（已与</a:t>
-            </a:r>
-            <a:r>
-              <a:rPr lang="en-US" altLang="zh-CN" sz="1400" dirty="0"/>
-              <a:t>Springer</a:t>
-            </a:r>
-            <a:r>
-              <a:rPr lang="zh-CN" altLang="en-US" sz="1400" dirty="0"/>
-              <a:t>出版社签约）</a:t>
-            </a:r>
-            <a:endParaRPr lang="en-US" altLang="zh-CN" sz="1400" dirty="0"/>
-          </a:p>
-          <a:p>
-            <a:r>
-              <a:rPr lang="zh-CN" altLang="en-US" sz="1400" b="1" dirty="0"/>
-              <a:t>发展新技术方法，引领科学性研究</a:t>
-            </a:r>
-            <a:endParaRPr lang="en-US" altLang="zh-CN" sz="1400" b="1" dirty="0"/>
-          </a:p>
-          <a:p>
-            <a:pPr marL="285750" indent="-285750">
-              <a:buFont typeface="Arial" panose="020B0604020202020204" pitchFamily="34" charset="0"/>
-              <a:buChar char="•"/>
-            </a:pPr>
-            <a:r>
-              <a:rPr lang="zh-CN" altLang="en-US" sz="1400" dirty="0"/>
-              <a:t>公共舆论动态比较</a:t>
-            </a:r>
-            <a:r>
-              <a:rPr lang="en-US" altLang="zh-CN" sz="1400" dirty="0"/>
-              <a:t>(DCPO)</a:t>
-            </a:r>
-            <a:r>
-              <a:rPr lang="zh-CN" altLang="en-US" sz="1400" b="1" dirty="0">
-                <a:solidFill>
-                  <a:srgbClr val="C00000"/>
-                </a:solidFill>
-              </a:rPr>
-              <a:t>国际合作项目</a:t>
-            </a:r>
-            <a:endParaRPr lang="en-US" altLang="zh-CN" sz="1400" b="1" dirty="0">
-              <a:solidFill>
-                <a:srgbClr val="C00000"/>
-              </a:solidFill>
-            </a:endParaRPr>
-          </a:p>
-          <a:p>
-            <a:pPr marL="285750" indent="-285750">
-              <a:buFont typeface="Arial" panose="020B0604020202020204" pitchFamily="34" charset="0"/>
-              <a:buChar char="•"/>
-            </a:pPr>
-            <a:r>
-              <a:rPr lang="zh-CN" altLang="en-US" sz="1400" dirty="0"/>
-              <a:t>“政治概念塑造与扩散”大数据与实验研究系列</a:t>
-            </a:r>
-            <a:endParaRPr lang="en-US" sz="1400" dirty="0"/>
-          </a:p>
-        </p:txBody>
-      </p:sp>
-      <p:sp>
-        <p:nvSpPr>
-          <p:cNvPr id="18" name="文本框 17">
-            <a:extLst>
-              <a:ext uri="{FF2B5EF4-FFF2-40B4-BE49-F238E27FC236}">
-                <a16:creationId xmlns:a16="http://schemas.microsoft.com/office/drawing/2014/main" id="{A4BBFF0F-2F64-40C9-86BD-3C4899514A83}"/>
-              </a:ext>
-            </a:extLst>
-          </p:cNvPr>
-          <p:cNvSpPr txBox="1"/>
-          <p:nvPr/>
-        </p:nvSpPr>
-        <p:spPr>
-          <a:xfrm>
-            <a:off x="1572269" y="4779023"/>
-            <a:ext cx="4936108" cy="954107"/>
-          </a:xfrm>
-          <a:prstGeom prst="rect">
-            <a:avLst/>
-          </a:prstGeom>
-          <a:noFill/>
-        </p:spPr>
-        <p:txBody>
-          <a:bodyPr wrap="square" rtlCol="0">
-            <a:spAutoFit/>
-          </a:bodyPr>
-          <a:lstStyle/>
-          <a:p>
-            <a:r>
-              <a:rPr lang="zh-CN" altLang="en-US" sz="1400" b="1" dirty="0"/>
-              <a:t>推进教学改革、出版高质量前沿教材</a:t>
-            </a:r>
-            <a:endParaRPr lang="en-US" altLang="zh-CN" sz="1400" b="1" dirty="0"/>
-          </a:p>
-          <a:p>
-            <a:pPr marL="285750" indent="-285750">
-              <a:buFont typeface="Arial" panose="020B0604020202020204" pitchFamily="34" charset="0"/>
-              <a:buChar char="•"/>
-            </a:pPr>
-            <a:r>
-              <a:rPr lang="zh-CN" altLang="en-US" sz="1400" dirty="0"/>
-              <a:t>打造精品专业课、推进教改项目</a:t>
-            </a:r>
-            <a:endParaRPr lang="en-US" altLang="zh-CN" sz="1400" dirty="0"/>
-          </a:p>
-          <a:p>
-            <a:pPr marL="285750" indent="-285750">
-              <a:buFont typeface="Arial" panose="020B0604020202020204" pitchFamily="34" charset="0"/>
-              <a:buChar char="•"/>
-            </a:pPr>
-            <a:r>
-              <a:rPr lang="zh-CN" altLang="en-US" sz="1400" dirty="0"/>
-              <a:t>清华</a:t>
-            </a:r>
-            <a:r>
-              <a:rPr lang="zh-CN" altLang="en-US" sz="1400" b="1" dirty="0">
-                <a:solidFill>
-                  <a:srgbClr val="C00000"/>
-                </a:solidFill>
-              </a:rPr>
-              <a:t>教师培训评估专家组</a:t>
-            </a:r>
-            <a:r>
-              <a:rPr lang="zh-CN" altLang="en-US" sz="1400" dirty="0"/>
-              <a:t>工作</a:t>
-            </a:r>
-            <a:endParaRPr lang="en-US" altLang="zh-CN" sz="1400" dirty="0"/>
-          </a:p>
-          <a:p>
-            <a:pPr marL="285750" indent="-285750">
-              <a:buFont typeface="Arial" panose="020B0604020202020204" pitchFamily="34" charset="0"/>
-              <a:buChar char="•"/>
-            </a:pPr>
-            <a:r>
-              <a:rPr lang="zh-CN" altLang="en-US" sz="1400" dirty="0"/>
-              <a:t>新文科</a:t>
-            </a:r>
-            <a:r>
-              <a:rPr lang="zh-CN" altLang="en-US" sz="1400" b="1" dirty="0">
-                <a:solidFill>
-                  <a:srgbClr val="C00000"/>
-                </a:solidFill>
-              </a:rPr>
-              <a:t>教材</a:t>
-            </a:r>
-            <a:r>
-              <a:rPr lang="zh-CN" altLang="en-US" sz="1400" dirty="0"/>
-              <a:t>（已与重庆大学出版社签约，“万卷方法”系列）</a:t>
-            </a:r>
-            <a:endParaRPr lang="en-US" altLang="zh-CN" sz="1400" dirty="0"/>
-          </a:p>
-        </p:txBody>
-      </p:sp>
-      <p:sp>
-        <p:nvSpPr>
-          <p:cNvPr id="19" name="文本框 18">
-            <a:extLst>
-              <a:ext uri="{FF2B5EF4-FFF2-40B4-BE49-F238E27FC236}">
-                <a16:creationId xmlns:a16="http://schemas.microsoft.com/office/drawing/2014/main" id="{FE38D626-E0AE-4C0C-B6A3-94650C8DBF89}"/>
-              </a:ext>
-            </a:extLst>
-          </p:cNvPr>
-          <p:cNvSpPr txBox="1"/>
-          <p:nvPr/>
-        </p:nvSpPr>
-        <p:spPr>
-          <a:xfrm>
-            <a:off x="4544071" y="3665185"/>
-            <a:ext cx="4223412" cy="738664"/>
-          </a:xfrm>
-          <a:prstGeom prst="rect">
-            <a:avLst/>
-          </a:prstGeom>
-          <a:noFill/>
-        </p:spPr>
-        <p:txBody>
-          <a:bodyPr wrap="square" rtlCol="0">
-            <a:spAutoFit/>
-          </a:bodyPr>
-          <a:lstStyle/>
-          <a:p>
-            <a:r>
-              <a:rPr lang="zh-CN" altLang="en-US" sz="1400" b="1" dirty="0"/>
-              <a:t>助力院校发展</a:t>
-            </a:r>
-            <a:endParaRPr lang="en-US" altLang="zh-CN" sz="1400" b="1" dirty="0"/>
-          </a:p>
-          <a:p>
-            <a:pPr marL="285750" indent="-285750">
-              <a:buFont typeface="Arial" panose="020B0604020202020204" pitchFamily="34" charset="0"/>
-              <a:buChar char="•"/>
-            </a:pPr>
-            <a:r>
-              <a:rPr lang="zh-CN" altLang="en-US" sz="1400" dirty="0"/>
-              <a:t>研工组：落实意识形态引领、心理问题疏导</a:t>
-            </a:r>
-            <a:endParaRPr lang="en-US" altLang="zh-CN" sz="1400" dirty="0"/>
-          </a:p>
-          <a:p>
-            <a:pPr marL="285750" indent="-285750">
-              <a:buFont typeface="Arial" panose="020B0604020202020204" pitchFamily="34" charset="0"/>
-              <a:buChar char="•"/>
-            </a:pPr>
-            <a:r>
-              <a:rPr lang="zh-CN" altLang="en-US" sz="1400" dirty="0"/>
-              <a:t>计算社科平台：计算社会科学</a:t>
-            </a:r>
-            <a:r>
-              <a:rPr lang="zh-CN" altLang="en-US" sz="1400" b="1" dirty="0">
-                <a:solidFill>
-                  <a:srgbClr val="C00000"/>
-                </a:solidFill>
-              </a:rPr>
-              <a:t>编程语言证书项目</a:t>
-            </a:r>
-            <a:endParaRPr lang="en-US" altLang="zh-CN" sz="1400" b="1" dirty="0">
-              <a:solidFill>
-                <a:srgbClr val="C00000"/>
-              </a:solidFill>
-            </a:endParaRPr>
-          </a:p>
-        </p:txBody>
-      </p:sp>
-      <p:sp>
-        <p:nvSpPr>
-          <p:cNvPr id="12" name="等腰三角形 11">
-            <a:extLst>
-              <a:ext uri="{FF2B5EF4-FFF2-40B4-BE49-F238E27FC236}">
-                <a16:creationId xmlns:a16="http://schemas.microsoft.com/office/drawing/2014/main" id="{BF855D58-4C25-4102-B91A-27B5029486A1}"/>
-              </a:ext>
-            </a:extLst>
-          </p:cNvPr>
-          <p:cNvSpPr/>
-          <p:nvPr/>
-        </p:nvSpPr>
-        <p:spPr>
-          <a:xfrm rot="10800000">
-            <a:off x="2088442" y="3320190"/>
-            <a:ext cx="1749655" cy="1259384"/>
-          </a:xfrm>
-          <a:prstGeom prst="triangle">
-            <a:avLst/>
-          </a:prstGeom>
-        </p:spPr>
-        <p:style>
-          <a:lnRef idx="2">
-            <a:schemeClr val="accent4">
-              <a:shade val="50000"/>
-            </a:schemeClr>
-          </a:lnRef>
-          <a:fillRef idx="1">
-            <a:schemeClr val="accent4"/>
-          </a:fillRef>
-          <a:effectRef idx="0">
-            <a:schemeClr val="accent4"/>
-          </a:effectRef>
-          <a:fontRef idx="minor">
-            <a:schemeClr val="lt1"/>
-          </a:fontRef>
-        </p:style>
-        <p:txBody>
-          <a:bodyPr rtlCol="0" anchor="ctr"/>
-          <a:lstStyle/>
-          <a:p>
-            <a:pPr algn="ctr"/>
-            <a:endParaRPr lang="en-US"/>
-          </a:p>
-        </p:txBody>
-      </p:sp>
-      <p:sp>
-        <p:nvSpPr>
-          <p:cNvPr id="22" name="文本框 21">
-            <a:extLst>
-              <a:ext uri="{FF2B5EF4-FFF2-40B4-BE49-F238E27FC236}">
-                <a16:creationId xmlns:a16="http://schemas.microsoft.com/office/drawing/2014/main" id="{7F9D3D17-CA24-4648-81D8-2F9EB4E9FE42}"/>
-              </a:ext>
-            </a:extLst>
-          </p:cNvPr>
-          <p:cNvSpPr txBox="1"/>
-          <p:nvPr/>
-        </p:nvSpPr>
-        <p:spPr>
-          <a:xfrm>
-            <a:off x="2615780" y="3443134"/>
-            <a:ext cx="667628" cy="677108"/>
-          </a:xfrm>
-          <a:prstGeom prst="rect">
-            <a:avLst/>
-          </a:prstGeom>
-          <a:noFill/>
-        </p:spPr>
-        <p:txBody>
-          <a:bodyPr wrap="square" rtlCol="0">
-            <a:spAutoFit/>
-          </a:bodyPr>
-          <a:lstStyle/>
-          <a:p>
-            <a:r>
-              <a:rPr lang="zh-CN" altLang="en-US" sz="1900" b="1" dirty="0"/>
-              <a:t>全面发展</a:t>
-            </a:r>
-            <a:endParaRPr lang="en-US" sz="1900" b="1" dirty="0"/>
-          </a:p>
-        </p:txBody>
-      </p:sp>
-    </p:spTree>
-    <p:extLst>
-      <p:ext uri="{BB962C8B-B14F-4D97-AF65-F5344CB8AC3E}">
-        <p14:creationId xmlns:p14="http://schemas.microsoft.com/office/powerpoint/2010/main" val="3131323880"/>
-      </p:ext>
-    </p:extLst>
-  </p:cSld>
-  <p:clrMapOvr>
-    <a:masterClrMapping/>
-  </p:clrMapOvr>
-</p:sld>
-</file>
-
 <file path=ppt/slides/slide3.xml><?xml version="1.0" encoding="utf-8"?>
 <p:sld xmlns:a="http://schemas.openxmlformats.org/drawingml/2006/main" xmlns:r="http://schemas.openxmlformats.org/officeDocument/2006/relationships" xmlns:p="http://schemas.openxmlformats.org/presentationml/2006/main">
   <p:cSld>

</xml_diff>